<commit_message>
presentation final 2 changes
</commit_message>
<xml_diff>
--- a/Assignment1/Ford Ka Presentation Final2.pptx
+++ b/Assignment1/Ford Ka Presentation Final2.pptx
@@ -6,10 +6,11 @@
   </p:sldMasterIdLst>
   <p:sldIdLst>
     <p:sldId id="257" r:id="rId2"/>
-    <p:sldId id="261" r:id="rId3"/>
-    <p:sldId id="272" r:id="rId4"/>
-    <p:sldId id="270" r:id="rId5"/>
-    <p:sldId id="268" r:id="rId6"/>
+    <p:sldId id="273" r:id="rId3"/>
+    <p:sldId id="261" r:id="rId4"/>
+    <p:sldId id="272" r:id="rId5"/>
+    <p:sldId id="270" r:id="rId6"/>
+    <p:sldId id="268" r:id="rId7"/>
   </p:sldIdLst>
   <p:sldSz cx="9144000" cy="6858000" type="screen4x3"/>
   <p:notesSz cx="6858000" cy="9144000"/>
@@ -125,6 +126,91 @@
     </p:ext>
   </p:extLst>
 </p:presentation>
+</file>
+
+<file path=ppt/revisionInfo.xml><?xml version="1.0" encoding="utf-8"?>
+<p1510:revInfo xmlns:a="http://schemas.openxmlformats.org/drawingml/2006/main" xmlns:r="http://schemas.openxmlformats.org/officeDocument/2006/relationships" xmlns:p1510="http://schemas.microsoft.com/office/powerpoint/2015/10/main">
+  <p1510:revLst>
+    <p1510:client id="{75F3B879-791F-4AA1-9994-93AA2B88F910}" v="2" dt="2019-03-25T16:45:32.792"/>
+  </p1510:revLst>
+</p1510:revInfo>
+</file>
+
+<file path=ppt/changesInfos/changesInfo1.xml><?xml version="1.0" encoding="utf-8"?>
+<pc:chgInfo xmlns:a="http://schemas.openxmlformats.org/drawingml/2006/main" xmlns:r="http://schemas.openxmlformats.org/officeDocument/2006/relationships" xmlns:ac="http://schemas.microsoft.com/office/drawing/2013/main/command" xmlns:pc="http://schemas.microsoft.com/office/powerpoint/2013/main/command">
+  <pc:docChgLst>
+    <pc:chgData name="joe standerfer" userId="1b337ce15d3046a8" providerId="LiveId" clId="{75F3B879-791F-4AA1-9994-93AA2B88F910}"/>
+    <pc:docChg chg="custSel addSld modSld">
+      <pc:chgData name="joe standerfer" userId="1b337ce15d3046a8" providerId="LiveId" clId="{75F3B879-791F-4AA1-9994-93AA2B88F910}" dt="2019-03-25T16:51:18.950" v="388" actId="20577"/>
+      <pc:docMkLst>
+        <pc:docMk/>
+      </pc:docMkLst>
+      <pc:sldChg chg="addSp delSp modSp add setBg">
+        <pc:chgData name="joe standerfer" userId="1b337ce15d3046a8" providerId="LiveId" clId="{75F3B879-791F-4AA1-9994-93AA2B88F910}" dt="2019-03-25T16:51:18.950" v="388" actId="20577"/>
+        <pc:sldMkLst>
+          <pc:docMk/>
+          <pc:sldMk cId="1389446267" sldId="273"/>
+        </pc:sldMkLst>
+        <pc:spChg chg="mod">
+          <ac:chgData name="joe standerfer" userId="1b337ce15d3046a8" providerId="LiveId" clId="{75F3B879-791F-4AA1-9994-93AA2B88F910}" dt="2019-03-25T16:45:54.436" v="86" actId="20577"/>
+          <ac:spMkLst>
+            <pc:docMk/>
+            <pc:sldMk cId="1389446267" sldId="273"/>
+            <ac:spMk id="2" creationId="{00000000-0000-0000-0000-000000000000}"/>
+          </ac:spMkLst>
+        </pc:spChg>
+        <pc:spChg chg="del mod">
+          <ac:chgData name="joe standerfer" userId="1b337ce15d3046a8" providerId="LiveId" clId="{75F3B879-791F-4AA1-9994-93AA2B88F910}" dt="2019-03-25T16:44:51.262" v="4" actId="478"/>
+          <ac:spMkLst>
+            <pc:docMk/>
+            <pc:sldMk cId="1389446267" sldId="273"/>
+            <ac:spMk id="3" creationId="{00000000-0000-0000-0000-000000000000}"/>
+          </ac:spMkLst>
+        </pc:spChg>
+        <pc:spChg chg="add del mod">
+          <ac:chgData name="joe standerfer" userId="1b337ce15d3046a8" providerId="LiveId" clId="{75F3B879-791F-4AA1-9994-93AA2B88F910}" dt="2019-03-25T16:45:39.826" v="57" actId="478"/>
+          <ac:spMkLst>
+            <pc:docMk/>
+            <pc:sldMk cId="1389446267" sldId="273"/>
+            <ac:spMk id="6" creationId="{5AFAE836-5807-4345-A8C4-1FE52945B399}"/>
+          </ac:spMkLst>
+        </pc:spChg>
+        <pc:spChg chg="del">
+          <ac:chgData name="joe standerfer" userId="1b337ce15d3046a8" providerId="LiveId" clId="{75F3B879-791F-4AA1-9994-93AA2B88F910}" dt="2019-03-25T16:44:53.755" v="5" actId="478"/>
+          <ac:spMkLst>
+            <pc:docMk/>
+            <pc:sldMk cId="1389446267" sldId="273"/>
+            <ac:spMk id="7" creationId="{013B0BC0-64B0-4556-B280-5A2D967F7DA7}"/>
+          </ac:spMkLst>
+        </pc:spChg>
+        <pc:spChg chg="del mod">
+          <ac:chgData name="joe standerfer" userId="1b337ce15d3046a8" providerId="LiveId" clId="{75F3B879-791F-4AA1-9994-93AA2B88F910}" dt="2019-03-25T16:45:02.555" v="7" actId="478"/>
+          <ac:spMkLst>
+            <pc:docMk/>
+            <pc:sldMk cId="1389446267" sldId="273"/>
+            <ac:spMk id="9" creationId="{DC9F8E04-EC7F-4E2B-BA0B-9A622E436448}"/>
+          </ac:spMkLst>
+        </pc:spChg>
+        <pc:spChg chg="add mod">
+          <ac:chgData name="joe standerfer" userId="1b337ce15d3046a8" providerId="LiveId" clId="{75F3B879-791F-4AA1-9994-93AA2B88F910}" dt="2019-03-25T16:51:18.950" v="388" actId="20577"/>
+          <ac:spMkLst>
+            <pc:docMk/>
+            <pc:sldMk cId="1389446267" sldId="273"/>
+            <ac:spMk id="11" creationId="{C3051B8D-F3B3-4D75-B42D-C8731BCD0057}"/>
+          </ac:spMkLst>
+        </pc:spChg>
+        <pc:picChg chg="del">
+          <ac:chgData name="joe standerfer" userId="1b337ce15d3046a8" providerId="LiveId" clId="{75F3B879-791F-4AA1-9994-93AA2B88F910}" dt="2019-03-25T16:44:46.441" v="1" actId="478"/>
+          <ac:picMkLst>
+            <pc:docMk/>
+            <pc:sldMk cId="1389446267" sldId="273"/>
+            <ac:picMk id="8" creationId="{460E7D43-2E9F-4B28-ABC1-1FC79C48FCAD}"/>
+          </ac:picMkLst>
+        </pc:picChg>
+      </pc:sldChg>
+    </pc:docChg>
+  </pc:docChgLst>
+</pc:chgInfo>
 </file>
 
 <file path=ppt/slideLayouts/slideLayout1.xml><?xml version="1.0" encoding="utf-8"?>
@@ -4232,18 +4318,6 @@
 <file path=ppt/slides/slide2.xml><?xml version="1.0" encoding="utf-8"?>
 <p:sld xmlns:a="http://schemas.openxmlformats.org/drawingml/2006/main" xmlns:r="http://schemas.openxmlformats.org/officeDocument/2006/relationships" xmlns:p="http://schemas.openxmlformats.org/presentationml/2006/main">
   <p:cSld>
-    <p:bg>
-      <p:bgPr>
-        <a:solidFill>
-          <a:schemeClr val="tx1">
-            <a:lumMod val="65000"/>
-            <a:lumOff val="35000"/>
-            <a:alpha val="11000"/>
-          </a:schemeClr>
-        </a:solidFill>
-        <a:effectLst/>
-      </p:bgPr>
-    </p:bg>
     <p:spTree>
       <p:nvGrpSpPr>
         <p:cNvPr id="1" name=""/>
@@ -4280,74 +4354,7 @@
           <a:p>
             <a:r>
               <a:rPr lang="en-US" dirty="0"/>
-              <a:t>Visualizing our Data</a:t>
-            </a:r>
-          </a:p>
-        </p:txBody>
-      </p:sp>
-      <p:sp>
-        <p:nvSpPr>
-          <p:cNvPr id="3" name="Content Placeholder 2"/>
-          <p:cNvSpPr>
-            <a:spLocks noGrp="1"/>
-          </p:cNvSpPr>
-          <p:nvPr>
-            <p:ph sz="half" idx="1"/>
-          </p:nvPr>
-        </p:nvSpPr>
-        <p:spPr>
-          <a:xfrm>
-            <a:off x="274066" y="1058537"/>
-            <a:ext cx="4017625" cy="4644680"/>
-          </a:xfrm>
-          <a:ln w="28575">
-            <a:solidFill>
-              <a:schemeClr val="accent1"/>
-            </a:solidFill>
-          </a:ln>
-        </p:spPr>
-        <p:txBody>
-          <a:bodyPr>
-            <a:noAutofit/>
-          </a:bodyPr>
-          <a:lstStyle/>
-          <a:p>
-            <a:pPr marL="0" indent="0">
-              <a:buNone/>
-            </a:pPr>
-            <a:r>
-              <a:rPr lang="en-US" sz="1800" dirty="0"/>
-              <a:t>Patterns:</a:t>
-            </a:r>
-          </a:p>
-          <a:p>
-            <a:pPr>
-              <a:buFontTx/>
-              <a:buChar char="-"/>
-            </a:pPr>
-            <a:r>
-              <a:rPr lang="en-US" sz="1800" dirty="0"/>
-              <a:t>The Buyers are looking for car performance and only somewhat consider the cars fashion and car-size into their buying decision</a:t>
-            </a:r>
-          </a:p>
-          <a:p>
-            <a:pPr>
-              <a:buFontTx/>
-              <a:buChar char="-"/>
-            </a:pPr>
-            <a:r>
-              <a:rPr lang="en-US" sz="1800" dirty="0"/>
-              <a:t>The Non-buyers (middle 4) are mainly concerned with performance and comfort. They pace little to no value in fashion or making a statement.</a:t>
-            </a:r>
-          </a:p>
-          <a:p>
-            <a:pPr>
-              <a:buFontTx/>
-              <a:buChar char="-"/>
-            </a:pPr>
-            <a:r>
-              <a:rPr lang="en-US" sz="1800" dirty="0"/>
-              <a:t>Those who fell in the middle placed a much higher value on fashion and would like their vehicle to make statement. Also, they were not looking for comfort or the ability to take road trips.</a:t>
+              <a:t>Segmentation Strategies</a:t>
             </a:r>
           </a:p>
         </p:txBody>
@@ -4375,182 +4382,177 @@
           </a:p>
         </p:txBody>
       </p:sp>
-      <p:pic>
-        <p:nvPicPr>
-          <p:cNvPr id="8" name="Picture 4" descr="https://lh3.googleusercontent.com/zJYZ8oybTWTxsIE3T3E0BHGa8t8e4ZxV6XRZKMbs6NOp7zRYImOqMMDqTXxP4MJeoQNTmHi8AObBoNjZxHfFw8kwL7dlHTY5rfSYgTYQ6dpBcnYBW-vgRVMoqVjguO1i1BB0DqoU">
+      <p:sp>
+        <p:nvSpPr>
+          <p:cNvPr id="11" name="Content Placeholder 10">
             <a:extLst>
               <a:ext uri="{FF2B5EF4-FFF2-40B4-BE49-F238E27FC236}">
-                <a16:creationId xmlns:a16="http://schemas.microsoft.com/office/drawing/2014/main" id="{460E7D43-2E9F-4B28-ABC1-1FC79C48FCAD}"/>
+                <a16:creationId xmlns:a16="http://schemas.microsoft.com/office/drawing/2014/main" id="{C3051B8D-F3B3-4D75-B42D-C8731BCD0057}"/>
               </a:ext>
             </a:extLst>
           </p:cNvPr>
-          <p:cNvPicPr>
-            <a:picLocks noGrp="1" noChangeAspect="1" noChangeArrowheads="1"/>
-          </p:cNvPicPr>
-          <p:nvPr>
-            <p:ph sz="half" idx="2"/>
-          </p:nvPr>
-        </p:nvPicPr>
-        <p:blipFill>
-          <a:blip r:embed="rId2">
-            <a:extLst>
-              <a:ext uri="{28A0092B-C50C-407E-A947-70E740481C1C}">
-                <a14:useLocalDpi xmlns:a14="http://schemas.microsoft.com/office/drawing/2010/main" val="0"/>
-              </a:ext>
-            </a:extLst>
-          </a:blip>
-          <a:srcRect/>
-          <a:stretch>
-            <a:fillRect/>
-          </a:stretch>
-        </p:blipFill>
-        <p:spPr bwMode="auto">
-          <a:xfrm>
-            <a:off x="4528562" y="1074036"/>
-            <a:ext cx="4306710" cy="3165956"/>
-          </a:xfrm>
-          <a:prstGeom prst="rect">
-            <a:avLst/>
-          </a:prstGeom>
-          <a:noFill/>
-          <a:ln w="28575">
-            <a:solidFill>
-              <a:schemeClr val="accent1"/>
-            </a:solidFill>
-          </a:ln>
-          <a:extLst>
-            <a:ext uri="{909E8E84-426E-40DD-AFC4-6F175D3DCCD1}">
-              <a14:hiddenFill xmlns:a14="http://schemas.microsoft.com/office/drawing/2010/main">
-                <a:solidFill>
-                  <a:srgbClr val="FFFFFF"/>
-                </a:solidFill>
-              </a14:hiddenFill>
-            </a:ext>
-          </a:extLst>
+          <p:cNvSpPr>
+            <a:spLocks noGrp="1"/>
+          </p:cNvSpPr>
+          <p:nvPr>
+            <p:ph sz="half" idx="1"/>
+          </p:nvPr>
+        </p:nvSpPr>
+        <p:spPr>
+          <a:xfrm>
+            <a:off x="685799" y="1159497"/>
+            <a:ext cx="7722909" cy="5222449"/>
+          </a:xfrm>
         </p:spPr>
-      </p:pic>
-      <p:sp>
-        <p:nvSpPr>
-          <p:cNvPr id="7" name="TextBox 6">
-            <a:extLst>
-              <a:ext uri="{FF2B5EF4-FFF2-40B4-BE49-F238E27FC236}">
-                <a16:creationId xmlns:a16="http://schemas.microsoft.com/office/drawing/2014/main" id="{013B0BC0-64B0-4556-B280-5A2D967F7DA7}"/>
-              </a:ext>
-            </a:extLst>
-          </p:cNvPr>
-          <p:cNvSpPr txBox="1"/>
-          <p:nvPr/>
-        </p:nvSpPr>
-        <p:spPr>
-          <a:xfrm>
-            <a:off x="5117447" y="104430"/>
-            <a:ext cx="3557954" cy="954107"/>
-          </a:xfrm>
-          <a:prstGeom prst="rect">
-            <a:avLst/>
-          </a:prstGeom>
-          <a:noFill/>
-        </p:spPr>
-        <p:txBody>
-          <a:bodyPr wrap="square" rtlCol="0">
-            <a:spAutoFit/>
+        <p:txBody>
+          <a:bodyPr>
+            <a:normAutofit lnSpcReduction="10000"/>
           </a:bodyPr>
           <a:lstStyle/>
           <a:p>
-            <a:r>
-              <a:rPr lang="en-US" sz="1400" dirty="0"/>
-              <a:t>Car preference ranking groups:</a:t>
-            </a:r>
-          </a:p>
-          <a:p>
-            <a:pPr marL="800100" lvl="1" indent="-342900">
-              <a:buAutoNum type="arabicParenR"/>
-            </a:pPr>
-            <a:r>
-              <a:rPr lang="en-US" sz="1400" dirty="0"/>
-              <a:t>Top 3 (Buyers)</a:t>
-            </a:r>
-          </a:p>
-          <a:p>
-            <a:pPr marL="800100" lvl="1" indent="-342900">
-              <a:buAutoNum type="arabicParenR"/>
-            </a:pPr>
-            <a:r>
-              <a:rPr lang="en-US" sz="1400" dirty="0"/>
-              <a:t>Bottom 3 (Non-buyers)</a:t>
-            </a:r>
-          </a:p>
-          <a:p>
-            <a:pPr marL="800100" lvl="1" indent="-342900">
-              <a:buAutoNum type="arabicParenR"/>
-            </a:pPr>
-            <a:r>
-              <a:rPr lang="en-US" sz="1400" dirty="0"/>
-              <a:t>Middle 4 (Fence)</a:t>
-            </a:r>
-          </a:p>
-        </p:txBody>
-      </p:sp>
-      <p:sp>
-        <p:nvSpPr>
-          <p:cNvPr id="9" name="Rectangle 8">
-            <a:extLst>
-              <a:ext uri="{FF2B5EF4-FFF2-40B4-BE49-F238E27FC236}">
-                <a16:creationId xmlns:a16="http://schemas.microsoft.com/office/drawing/2014/main" id="{DC9F8E04-EC7F-4E2B-BA0B-9A622E436448}"/>
-              </a:ext>
-            </a:extLst>
-          </p:cNvPr>
-          <p:cNvSpPr/>
-          <p:nvPr/>
-        </p:nvSpPr>
-        <p:spPr>
-          <a:xfrm>
-            <a:off x="4425610" y="4383291"/>
-            <a:ext cx="4718390" cy="1815882"/>
-          </a:xfrm>
-          <a:prstGeom prst="rect">
-            <a:avLst/>
-          </a:prstGeom>
-        </p:spPr>
-        <p:txBody>
-          <a:bodyPr wrap="square">
-            <a:spAutoFit/>
-          </a:bodyPr>
-          <a:lstStyle/>
-          <a:p>
-            <a:r>
-              <a:rPr lang="en-US" sz="1400" dirty="0"/>
-              <a:t>Q2. I am fashion conscious.</a:t>
-            </a:r>
-          </a:p>
-          <a:p>
-            <a:r>
-              <a:rPr lang="en-US" sz="1400" dirty="0"/>
-              <a:t>Q14. The car I buy must be able to handle long motorway journeys.</a:t>
-            </a:r>
-          </a:p>
-          <a:p>
-            <a:r>
-              <a:rPr lang="en-US" sz="1400" dirty="0"/>
-              <a:t>Q17. I want a car that is nippy and zippy.</a:t>
-            </a:r>
-          </a:p>
-          <a:p>
-            <a:r>
-              <a:rPr lang="en-US" sz="1400" dirty="0"/>
-              <a:t>Q31. I want a comfortable car.</a:t>
-            </a:r>
-          </a:p>
-          <a:p>
-            <a:r>
-              <a:rPr lang="en-US" sz="1400" dirty="0"/>
-              <a:t>Q41. In today's world it is anti-social to drive big cars.</a:t>
-            </a:r>
-          </a:p>
-          <a:p>
-            <a:r>
-              <a:rPr lang="en-US" sz="1400" dirty="0"/>
-              <a:t>Q44. I want to buy a car that makes a statement about me.</a:t>
+            <a:endParaRPr lang="en-US" dirty="0"/>
+          </a:p>
+          <a:p>
+            <a:pPr lvl="1" fontAlgn="base"/>
+            <a:r>
+              <a:rPr lang="en-US" b="1" dirty="0"/>
+              <a:t>Gender segmentation</a:t>
+            </a:r>
+            <a:r>
+              <a:rPr lang="en-US" dirty="0"/>
+              <a:t> – </a:t>
+            </a:r>
+            <a:r>
+              <a:rPr lang="en-US" u="sng" dirty="0"/>
+              <a:t>The marketing team</a:t>
+            </a:r>
+            <a:r>
+              <a:rPr lang="en-US" dirty="0"/>
+              <a:t> </a:t>
+            </a:r>
+          </a:p>
+          <a:p>
+            <a:pPr lvl="2" fontAlgn="base"/>
+            <a:r>
+              <a:rPr lang="en-US" dirty="0"/>
+              <a:t>Pro: Women are more likely to buy small cars</a:t>
+            </a:r>
+          </a:p>
+          <a:p>
+            <a:pPr lvl="2" fontAlgn="base"/>
+            <a:r>
+              <a:rPr lang="en-US" dirty="0"/>
+              <a:t>Con: Unoriginal strategy; already being employed by the Peugeot 106.</a:t>
+            </a:r>
+          </a:p>
+          <a:p>
+            <a:pPr lvl="1" fontAlgn="base"/>
+            <a:r>
+              <a:rPr lang="en-US" b="1" dirty="0"/>
+              <a:t>Attitudinal segmentation</a:t>
+            </a:r>
+            <a:r>
+              <a:rPr lang="en-US" dirty="0"/>
+              <a:t> – The </a:t>
+            </a:r>
+            <a:r>
+              <a:rPr lang="en-US" u="sng" dirty="0"/>
+              <a:t>advertising agency</a:t>
+            </a:r>
+            <a:r>
+              <a:rPr lang="en-US" dirty="0"/>
+              <a:t> </a:t>
+            </a:r>
+          </a:p>
+          <a:p>
+            <a:pPr lvl="2" fontAlgn="base"/>
+            <a:r>
+              <a:rPr lang="en-US" dirty="0"/>
+              <a:t>Pro: “Freedom Lovers” and “Attention Seekers” emerged from the cluster analysis of the psychographic tests.</a:t>
+            </a:r>
+          </a:p>
+          <a:p>
+            <a:pPr lvl="2" fontAlgn="base"/>
+            <a:r>
+              <a:rPr lang="en-US" dirty="0"/>
+              <a:t>Con: more expensive to target groups</a:t>
+            </a:r>
+          </a:p>
+          <a:p>
+            <a:pPr lvl="1" fontAlgn="base"/>
+            <a:r>
+              <a:rPr lang="en-US" b="1" dirty="0"/>
+              <a:t>Demographic Segmentation</a:t>
+            </a:r>
+            <a:r>
+              <a:rPr lang="en-US" dirty="0"/>
+              <a:t> – </a:t>
+            </a:r>
+            <a:r>
+              <a:rPr lang="en-US" u="sng" dirty="0"/>
+              <a:t>senior management</a:t>
+            </a:r>
+            <a:r>
+              <a:rPr lang="en-US" dirty="0"/>
+              <a:t>,</a:t>
+            </a:r>
+          </a:p>
+          <a:p>
+            <a:pPr lvl="2" fontAlgn="base"/>
+            <a:r>
+              <a:rPr lang="en-US" dirty="0"/>
+              <a:t>Pro: Historical method of segmentation and using “observable” characteristics made it easier to identify and target an audience. </a:t>
+            </a:r>
+          </a:p>
+          <a:p>
+            <a:pPr lvl="2" fontAlgn="base"/>
+            <a:r>
+              <a:rPr lang="en-US" dirty="0"/>
+              <a:t>The target groups would be “working singles”, “first-time buyers”,  and “multi-car households”</a:t>
+            </a:r>
+          </a:p>
+          <a:p>
+            <a:pPr lvl="2" fontAlgn="base"/>
+            <a:r>
+              <a:rPr lang="en-US" dirty="0"/>
+              <a:t>Con: Market has changed</a:t>
+            </a:r>
+          </a:p>
+          <a:p>
+            <a:pPr lvl="1"/>
+            <a:r>
+              <a:rPr lang="en-US" b="1" dirty="0"/>
+              <a:t>Current Car Segmentation </a:t>
+            </a:r>
+            <a:r>
+              <a:rPr lang="en-US" dirty="0"/>
+              <a:t>– </a:t>
+            </a:r>
+            <a:r>
+              <a:rPr lang="en-US" u="sng" dirty="0"/>
+              <a:t>Dealership owners</a:t>
+            </a:r>
+            <a:r>
+              <a:rPr lang="en-US" dirty="0"/>
+              <a:t> </a:t>
+            </a:r>
+          </a:p>
+          <a:p>
+            <a:pPr lvl="2"/>
+            <a:r>
+              <a:rPr lang="en-US"/>
+              <a:t>Pro: Cheapest </a:t>
+            </a:r>
+            <a:r>
+              <a:rPr lang="en-US" dirty="0"/>
+              <a:t>way to target individuals because mailing lists were already available. </a:t>
+            </a:r>
+          </a:p>
+          <a:p>
+            <a:pPr lvl="2"/>
+            <a:r>
+              <a:rPr lang="en-US" dirty="0"/>
+              <a:t>Con: Owners could be reluctant to buy non-French brands and may be looking for something else now.</a:t>
             </a:r>
           </a:p>
         </p:txBody>
@@ -4558,7 +4560,7 @@
     </p:spTree>
     <p:extLst>
       <p:ext uri="{BB962C8B-B14F-4D97-AF65-F5344CB8AC3E}">
-        <p14:creationId xmlns:p14="http://schemas.microsoft.com/office/powerpoint/2010/main" val="1865572983"/>
+        <p14:creationId xmlns:p14="http://schemas.microsoft.com/office/powerpoint/2010/main" val="1389446267"/>
       </p:ext>
     </p:extLst>
   </p:cSld>
@@ -4609,26 +4611,91 @@
         </p:nvSpPr>
         <p:spPr>
           <a:xfrm>
-            <a:off x="1376038" y="11440"/>
-            <a:ext cx="7448365" cy="971983"/>
+            <a:off x="308728" y="22796"/>
+            <a:ext cx="8378073" cy="1051860"/>
           </a:xfrm>
         </p:spPr>
         <p:txBody>
+          <a:bodyPr/>
+          <a:lstStyle/>
+          <a:p>
+            <a:r>
+              <a:rPr lang="en-US" dirty="0"/>
+              <a:t>Visualizing our Data</a:t>
+            </a:r>
+          </a:p>
+        </p:txBody>
+      </p:sp>
+      <p:sp>
+        <p:nvSpPr>
+          <p:cNvPr id="3" name="Content Placeholder 2"/>
+          <p:cNvSpPr>
+            <a:spLocks noGrp="1"/>
+          </p:cNvSpPr>
+          <p:nvPr>
+            <p:ph sz="half" idx="1"/>
+          </p:nvPr>
+        </p:nvSpPr>
+        <p:spPr>
+          <a:xfrm>
+            <a:off x="274066" y="1058537"/>
+            <a:ext cx="4017625" cy="4644680"/>
+          </a:xfrm>
+          <a:ln w="28575">
+            <a:solidFill>
+              <a:schemeClr val="accent1"/>
+            </a:solidFill>
+          </a:ln>
+        </p:spPr>
+        <p:txBody>
           <a:bodyPr>
-            <a:normAutofit/>
+            <a:noAutofit/>
           </a:bodyPr>
           <a:lstStyle/>
           <a:p>
-            <a:r>
-              <a:rPr lang="en-US" u="sng" dirty="0"/>
-              <a:t>What do the clusters mean?</a:t>
-            </a:r>
-          </a:p>
-        </p:txBody>
-      </p:sp>
-      <p:sp>
-        <p:nvSpPr>
-          <p:cNvPr id="5" name="Slide Number Placeholder 4"/>
+            <a:pPr marL="0" indent="0">
+              <a:buNone/>
+            </a:pPr>
+            <a:r>
+              <a:rPr lang="en-US" sz="1800" dirty="0"/>
+              <a:t>Patterns:</a:t>
+            </a:r>
+          </a:p>
+          <a:p>
+            <a:pPr>
+              <a:buFontTx/>
+              <a:buChar char="-"/>
+            </a:pPr>
+            <a:r>
+              <a:rPr lang="en-US" sz="1800" dirty="0"/>
+              <a:t>The Buyers are looking for car performance and only somewhat consider the cars fashion and car-size into their buying decision</a:t>
+            </a:r>
+          </a:p>
+          <a:p>
+            <a:pPr>
+              <a:buFontTx/>
+              <a:buChar char="-"/>
+            </a:pPr>
+            <a:r>
+              <a:rPr lang="en-US" sz="1800" dirty="0"/>
+              <a:t>The Non-buyers (middle 4) are mainly concerned with performance and comfort. They pace little to no value in fashion or making a statement.</a:t>
+            </a:r>
+          </a:p>
+          <a:p>
+            <a:pPr>
+              <a:buFontTx/>
+              <a:buChar char="-"/>
+            </a:pPr>
+            <a:r>
+              <a:rPr lang="en-US" sz="1800" dirty="0"/>
+              <a:t>Those who fell in the middle placed a much higher value on fashion and would like their vehicle to make statement. Also, they were not looking for comfort or the ability to take road trips.</a:t>
+            </a:r>
+          </a:p>
+        </p:txBody>
+      </p:sp>
+      <p:sp>
+        <p:nvSpPr>
+          <p:cNvPr id="4" name="Slide Number Placeholder 3"/>
           <p:cNvSpPr>
             <a:spLocks noGrp="1"/>
           </p:cNvSpPr>
@@ -4641,20 +4708,20 @@
           <a:bodyPr/>
           <a:lstStyle/>
           <a:p>
-            <a:fld id="{EA1E5914-59AA-0F4C-8D89-5ECCA83988DE}" type="slidenum">
+            <a:fld id="{4FAB73BC-B049-4115-A692-8D63A059BFB8}" type="slidenum">
               <a:rPr lang="en-US" smtClean="0"/>
               <a:t>3</a:t>
             </a:fld>
-            <a:endParaRPr lang="en-US"/>
+            <a:endParaRPr lang="en-US" dirty="0"/>
           </a:p>
         </p:txBody>
       </p:sp>
       <p:pic>
         <p:nvPicPr>
-          <p:cNvPr id="6" name="Picture 2" descr="https://lh6.googleusercontent.com/VixHdfGrQRmcIuYgWlmmr8RT0ROncXj5wNa3bpEtQfSmTdH9wHRIzn1Yi95ggrC1lnIVNt1K3nC6LE9mbhM-zg72pqzf38ZSlzczdtqiEPJvX_puc_wjLHyfmvRQvIly23GI0zXf">
+          <p:cNvPr id="8" name="Picture 4" descr="https://lh3.googleusercontent.com/zJYZ8oybTWTxsIE3T3E0BHGa8t8e4ZxV6XRZKMbs6NOp7zRYImOqMMDqTXxP4MJeoQNTmHi8AObBoNjZxHfFw8kwL7dlHTY5rfSYgTYQ6dpBcnYBW-vgRVMoqVjguO1i1BB0DqoU">
             <a:extLst>
               <a:ext uri="{FF2B5EF4-FFF2-40B4-BE49-F238E27FC236}">
-                <a16:creationId xmlns:a16="http://schemas.microsoft.com/office/drawing/2014/main" id="{EDCE9905-9597-4AB9-B332-C22DF8026B91}"/>
+                <a16:creationId xmlns:a16="http://schemas.microsoft.com/office/drawing/2014/main" id="{460E7D43-2E9F-4B28-ABC1-1FC79C48FCAD}"/>
               </a:ext>
             </a:extLst>
           </p:cNvPr>
@@ -4680,8 +4747,8 @@
         </p:blipFill>
         <p:spPr bwMode="auto">
           <a:xfrm>
-            <a:off x="294522" y="1342361"/>
-            <a:ext cx="4503721" cy="4540254"/>
+            <a:off x="4528562" y="1074036"/>
+            <a:ext cx="4306710" cy="3165956"/>
           </a:xfrm>
           <a:prstGeom prst="rect">
             <a:avLst/>
@@ -4705,109 +4772,134 @@
       </p:pic>
       <p:sp>
         <p:nvSpPr>
-          <p:cNvPr id="8" name="Text Placeholder 5">
+          <p:cNvPr id="7" name="TextBox 6">
             <a:extLst>
               <a:ext uri="{FF2B5EF4-FFF2-40B4-BE49-F238E27FC236}">
-                <a16:creationId xmlns:a16="http://schemas.microsoft.com/office/drawing/2014/main" id="{0F8E84C6-CF58-4740-B859-219CA09AF636}"/>
+                <a16:creationId xmlns:a16="http://schemas.microsoft.com/office/drawing/2014/main" id="{013B0BC0-64B0-4556-B280-5A2D967F7DA7}"/>
               </a:ext>
             </a:extLst>
           </p:cNvPr>
-          <p:cNvSpPr>
-            <a:spLocks noGrp="1"/>
-          </p:cNvSpPr>
-          <p:nvPr>
-            <p:ph type="body" idx="1"/>
-          </p:nvPr>
+          <p:cNvSpPr txBox="1"/>
+          <p:nvPr/>
         </p:nvSpPr>
         <p:spPr>
           <a:xfrm>
-            <a:off x="343635" y="712356"/>
-            <a:ext cx="4040188" cy="639762"/>
-          </a:xfrm>
+            <a:off x="5117447" y="104430"/>
+            <a:ext cx="3557954" cy="954107"/>
+          </a:xfrm>
+          <a:prstGeom prst="rect">
+            <a:avLst/>
+          </a:prstGeom>
+          <a:noFill/>
         </p:spPr>
         <p:txBody>
-          <a:bodyPr/>
+          <a:bodyPr wrap="square" rtlCol="0">
+            <a:spAutoFit/>
+          </a:bodyPr>
           <a:lstStyle/>
           <a:p>
             <a:r>
-              <a:rPr lang="en-US" dirty="0"/>
-              <a:t>What are your clusters?</a:t>
-            </a:r>
-          </a:p>
-        </p:txBody>
-      </p:sp>
-      <p:sp>
-        <p:nvSpPr>
-          <p:cNvPr id="10" name="Text Placeholder 7">
+              <a:rPr lang="en-US" sz="1400" dirty="0"/>
+              <a:t>Car preference ranking groups:</a:t>
+            </a:r>
+          </a:p>
+          <a:p>
+            <a:pPr marL="800100" lvl="1" indent="-342900">
+              <a:buAutoNum type="arabicParenR"/>
+            </a:pPr>
+            <a:r>
+              <a:rPr lang="en-US" sz="1400" dirty="0"/>
+              <a:t>Top 3 (Buyers)</a:t>
+            </a:r>
+          </a:p>
+          <a:p>
+            <a:pPr marL="800100" lvl="1" indent="-342900">
+              <a:buAutoNum type="arabicParenR"/>
+            </a:pPr>
+            <a:r>
+              <a:rPr lang="en-US" sz="1400" dirty="0"/>
+              <a:t>Bottom 3 (Non-buyers)</a:t>
+            </a:r>
+          </a:p>
+          <a:p>
+            <a:pPr marL="800100" lvl="1" indent="-342900">
+              <a:buAutoNum type="arabicParenR"/>
+            </a:pPr>
+            <a:r>
+              <a:rPr lang="en-US" sz="1400" dirty="0"/>
+              <a:t>Middle 4 (Fence)</a:t>
+            </a:r>
+          </a:p>
+        </p:txBody>
+      </p:sp>
+      <p:sp>
+        <p:nvSpPr>
+          <p:cNvPr id="9" name="Rectangle 8">
             <a:extLst>
               <a:ext uri="{FF2B5EF4-FFF2-40B4-BE49-F238E27FC236}">
-                <a16:creationId xmlns:a16="http://schemas.microsoft.com/office/drawing/2014/main" id="{A24945EA-4CA9-41B5-977A-CF05D2CC03F9}"/>
+                <a16:creationId xmlns:a16="http://schemas.microsoft.com/office/drawing/2014/main" id="{DC9F8E04-EC7F-4E2B-BA0B-9A622E436448}"/>
               </a:ext>
             </a:extLst>
           </p:cNvPr>
-          <p:cNvSpPr>
-            <a:spLocks noGrp="1"/>
-          </p:cNvSpPr>
-          <p:nvPr>
-            <p:ph type="body" sz="quarter" idx="3"/>
-          </p:nvPr>
+          <p:cNvSpPr/>
+          <p:nvPr/>
         </p:nvSpPr>
         <p:spPr>
           <a:xfrm>
-            <a:off x="4987497" y="717643"/>
-            <a:ext cx="4041775" cy="639762"/>
-          </a:xfrm>
-        </p:spPr>
-        <p:txBody>
-          <a:bodyPr/>
-          <a:lstStyle/>
-          <a:p>
-            <a:r>
-              <a:rPr lang="en-US" dirty="0"/>
-              <a:t>What do your clusters mean?</a:t>
-            </a:r>
-          </a:p>
-        </p:txBody>
-      </p:sp>
-      <p:pic>
-        <p:nvPicPr>
-          <p:cNvPr id="3" name="Picture 2">
-            <a:extLst>
-              <a:ext uri="{FF2B5EF4-FFF2-40B4-BE49-F238E27FC236}">
-                <a16:creationId xmlns:a16="http://schemas.microsoft.com/office/drawing/2014/main" id="{BE073E3F-8FD5-4F38-8F49-E1CE71D31B6B}"/>
-              </a:ext>
-            </a:extLst>
-          </p:cNvPr>
-          <p:cNvPicPr>
-            <a:picLocks noChangeAspect="1"/>
-          </p:cNvPicPr>
-          <p:nvPr/>
-        </p:nvPicPr>
-        <p:blipFill>
-          <a:blip r:embed="rId3"/>
-          <a:stretch>
-            <a:fillRect/>
-          </a:stretch>
-        </p:blipFill>
-        <p:spPr>
-          <a:xfrm>
-            <a:off x="4987497" y="1342361"/>
-            <a:ext cx="3861981" cy="4540255"/>
+            <a:off x="4425610" y="4383291"/>
+            <a:ext cx="4718390" cy="1815882"/>
           </a:xfrm>
           <a:prstGeom prst="rect">
             <a:avLst/>
           </a:prstGeom>
-          <a:ln w="28575">
-            <a:solidFill>
-              <a:schemeClr val="accent1"/>
-            </a:solidFill>
-          </a:ln>
         </p:spPr>
-      </p:pic>
+        <p:txBody>
+          <a:bodyPr wrap="square">
+            <a:spAutoFit/>
+          </a:bodyPr>
+          <a:lstStyle/>
+          <a:p>
+            <a:r>
+              <a:rPr lang="en-US" sz="1400" dirty="0"/>
+              <a:t>Q2. I am fashion conscious.</a:t>
+            </a:r>
+          </a:p>
+          <a:p>
+            <a:r>
+              <a:rPr lang="en-US" sz="1400" dirty="0"/>
+              <a:t>Q14. The car I buy must be able to handle long motorway journeys.</a:t>
+            </a:r>
+          </a:p>
+          <a:p>
+            <a:r>
+              <a:rPr lang="en-US" sz="1400" dirty="0"/>
+              <a:t>Q17. I want a car that is nippy and zippy.</a:t>
+            </a:r>
+          </a:p>
+          <a:p>
+            <a:r>
+              <a:rPr lang="en-US" sz="1400" dirty="0"/>
+              <a:t>Q31. I want a comfortable car.</a:t>
+            </a:r>
+          </a:p>
+          <a:p>
+            <a:r>
+              <a:rPr lang="en-US" sz="1400" dirty="0"/>
+              <a:t>Q41. In today's world it is anti-social to drive big cars.</a:t>
+            </a:r>
+          </a:p>
+          <a:p>
+            <a:r>
+              <a:rPr lang="en-US" sz="1400" dirty="0"/>
+              <a:t>Q44. I want to buy a car that makes a statement about me.</a:t>
+            </a:r>
+          </a:p>
+        </p:txBody>
+      </p:sp>
     </p:spTree>
     <p:extLst>
       <p:ext uri="{BB962C8B-B14F-4D97-AF65-F5344CB8AC3E}">
-        <p14:creationId xmlns:p14="http://schemas.microsoft.com/office/powerpoint/2010/main" val="2546418469"/>
+        <p14:creationId xmlns:p14="http://schemas.microsoft.com/office/powerpoint/2010/main" val="1865572983"/>
       </p:ext>
     </p:extLst>
   </p:cSld>
@@ -4900,17 +4992,19 @@
       </p:sp>
       <p:pic>
         <p:nvPicPr>
-          <p:cNvPr id="9" name="Picture 4" descr="https://lh6.googleusercontent.com/-IfvYMe_tcr2NFt5zekZpEQG3vQNcaJavVp_oOV2gP1oPzwm5Ff2FxCe0BzKardDI5SF19qVu2zrVwUcP0xKyR7dreHFJF85HuieCUS9g6qgi-MbENEPWUtOS_atyLsLYuMCyhLU">
+          <p:cNvPr id="6" name="Picture 2" descr="https://lh6.googleusercontent.com/VixHdfGrQRmcIuYgWlmmr8RT0ROncXj5wNa3bpEtQfSmTdH9wHRIzn1Yi95ggrC1lnIVNt1K3nC6LE9mbhM-zg72pqzf38ZSlzczdtqiEPJvX_puc_wjLHyfmvRQvIly23GI0zXf">
             <a:extLst>
               <a:ext uri="{FF2B5EF4-FFF2-40B4-BE49-F238E27FC236}">
-                <a16:creationId xmlns:a16="http://schemas.microsoft.com/office/drawing/2014/main" id="{797D4E93-47A9-4C48-8E9E-925742EDA059}"/>
+                <a16:creationId xmlns:a16="http://schemas.microsoft.com/office/drawing/2014/main" id="{EDCE9905-9597-4AB9-B332-C22DF8026B91}"/>
               </a:ext>
             </a:extLst>
           </p:cNvPr>
           <p:cNvPicPr>
-            <a:picLocks noChangeAspect="1" noChangeArrowheads="1"/>
+            <a:picLocks noGrp="1" noChangeAspect="1" noChangeArrowheads="1"/>
           </p:cNvPicPr>
-          <p:nvPr/>
+          <p:nvPr>
+            <p:ph sz="half" idx="2"/>
+          </p:nvPr>
         </p:nvPicPr>
         <p:blipFill>
           <a:blip r:embed="rId2">
@@ -4927,8 +5021,8 @@
         </p:blipFill>
         <p:spPr bwMode="auto">
           <a:xfrm>
-            <a:off x="361249" y="1322331"/>
-            <a:ext cx="4531261" cy="4560283"/>
+            <a:off x="294522" y="1342361"/>
+            <a:ext cx="4503721" cy="4540254"/>
           </a:xfrm>
           <a:prstGeom prst="rect">
             <a:avLst/>
@@ -4952,10 +5046,10 @@
       </p:pic>
       <p:sp>
         <p:nvSpPr>
-          <p:cNvPr id="10" name="Text Placeholder 5">
+          <p:cNvPr id="8" name="Text Placeholder 5">
             <a:extLst>
               <a:ext uri="{FF2B5EF4-FFF2-40B4-BE49-F238E27FC236}">
-                <a16:creationId xmlns:a16="http://schemas.microsoft.com/office/drawing/2014/main" id="{E5027DF6-2FDD-4035-9CF4-EFFE4D05E040}"/>
+                <a16:creationId xmlns:a16="http://schemas.microsoft.com/office/drawing/2014/main" id="{0F8E84C6-CF58-4740-B859-219CA09AF636}"/>
               </a:ext>
             </a:extLst>
           </p:cNvPr>
@@ -4985,10 +5079,10 @@
       </p:sp>
       <p:sp>
         <p:nvSpPr>
-          <p:cNvPr id="11" name="Text Placeholder 7">
+          <p:cNvPr id="10" name="Text Placeholder 7">
             <a:extLst>
               <a:ext uri="{FF2B5EF4-FFF2-40B4-BE49-F238E27FC236}">
-                <a16:creationId xmlns:a16="http://schemas.microsoft.com/office/drawing/2014/main" id="{54061676-15DF-44D5-AD52-347A88245147}"/>
+                <a16:creationId xmlns:a16="http://schemas.microsoft.com/office/drawing/2014/main" id="{A24945EA-4CA9-41B5-977A-CF05D2CC03F9}"/>
               </a:ext>
             </a:extLst>
           </p:cNvPr>
@@ -5001,7 +5095,7 @@
         </p:nvSpPr>
         <p:spPr>
           <a:xfrm>
-            <a:off x="4949791" y="708216"/>
+            <a:off x="4987497" y="717643"/>
             <a:ext cx="4041775" cy="639762"/>
           </a:xfrm>
         </p:spPr>
@@ -5018,10 +5112,10 @@
       </p:sp>
       <p:pic>
         <p:nvPicPr>
-          <p:cNvPr id="12" name="Picture 11">
+          <p:cNvPr id="3" name="Picture 2">
             <a:extLst>
               <a:ext uri="{FF2B5EF4-FFF2-40B4-BE49-F238E27FC236}">
-                <a16:creationId xmlns:a16="http://schemas.microsoft.com/office/drawing/2014/main" id="{1FC7D4CE-311D-447D-BF14-59870650E344}"/>
+                <a16:creationId xmlns:a16="http://schemas.microsoft.com/office/drawing/2014/main" id="{BE073E3F-8FD5-4F38-8F49-E1CE71D31B6B}"/>
               </a:ext>
             </a:extLst>
           </p:cNvPr>
@@ -5038,8 +5132,8 @@
         </p:blipFill>
         <p:spPr>
           <a:xfrm>
-            <a:off x="4987497" y="1322331"/>
-            <a:ext cx="3879017" cy="4560283"/>
+            <a:off x="4987497" y="1342361"/>
+            <a:ext cx="3861981" cy="4540255"/>
           </a:xfrm>
           <a:prstGeom prst="rect">
             <a:avLst/>
@@ -5054,7 +5148,7 @@
     </p:spTree>
     <p:extLst>
       <p:ext uri="{BB962C8B-B14F-4D97-AF65-F5344CB8AC3E}">
-        <p14:creationId xmlns:p14="http://schemas.microsoft.com/office/powerpoint/2010/main" val="3152235314"/>
+        <p14:creationId xmlns:p14="http://schemas.microsoft.com/office/powerpoint/2010/main" val="2546418469"/>
       </p:ext>
     </p:extLst>
   </p:cSld>
@@ -5105,8 +5199,8 @@
         </p:nvSpPr>
         <p:spPr>
           <a:xfrm>
-            <a:off x="959179" y="65989"/>
-            <a:ext cx="7270423" cy="1055802"/>
+            <a:off x="1376038" y="11440"/>
+            <a:ext cx="7448365" cy="971983"/>
           </a:xfrm>
         </p:spPr>
         <p:txBody>
@@ -5116,26 +5210,244 @@
           <a:lstStyle/>
           <a:p>
             <a:r>
-              <a:rPr lang="en-US" sz="3600" dirty="0"/>
-              <a:t>Recommendation of Clustering Solution</a:t>
-            </a:r>
-          </a:p>
-        </p:txBody>
-      </p:sp>
-      <p:sp>
-        <p:nvSpPr>
-          <p:cNvPr id="3" name="Content Placeholder 2"/>
-          <p:cNvSpPr>
-            <a:spLocks noGrp="1"/>
-          </p:cNvSpPr>
-          <p:nvPr>
-            <p:ph idx="1"/>
+              <a:rPr lang="en-US" u="sng" dirty="0"/>
+              <a:t>What do the clusters mean?</a:t>
+            </a:r>
+          </a:p>
+        </p:txBody>
+      </p:sp>
+      <p:sp>
+        <p:nvSpPr>
+          <p:cNvPr id="5" name="Slide Number Placeholder 4"/>
+          <p:cNvSpPr>
+            <a:spLocks noGrp="1"/>
+          </p:cNvSpPr>
+          <p:nvPr>
+            <p:ph type="sldNum" sz="quarter" idx="12"/>
+          </p:nvPr>
+        </p:nvSpPr>
+        <p:spPr/>
+        <p:txBody>
+          <a:bodyPr/>
+          <a:lstStyle/>
+          <a:p>
+            <a:fld id="{EA1E5914-59AA-0F4C-8D89-5ECCA83988DE}" type="slidenum">
+              <a:rPr lang="en-US" smtClean="0"/>
+              <a:t>5</a:t>
+            </a:fld>
+            <a:endParaRPr lang="en-US"/>
+          </a:p>
+        </p:txBody>
+      </p:sp>
+      <p:pic>
+        <p:nvPicPr>
+          <p:cNvPr id="9" name="Picture 4" descr="https://lh6.googleusercontent.com/-IfvYMe_tcr2NFt5zekZpEQG3vQNcaJavVp_oOV2gP1oPzwm5Ff2FxCe0BzKardDI5SF19qVu2zrVwUcP0xKyR7dreHFJF85HuieCUS9g6qgi-MbENEPWUtOS_atyLsLYuMCyhLU">
+            <a:extLst>
+              <a:ext uri="{FF2B5EF4-FFF2-40B4-BE49-F238E27FC236}">
+                <a16:creationId xmlns:a16="http://schemas.microsoft.com/office/drawing/2014/main" id="{797D4E93-47A9-4C48-8E9E-925742EDA059}"/>
+              </a:ext>
+            </a:extLst>
+          </p:cNvPr>
+          <p:cNvPicPr>
+            <a:picLocks noChangeAspect="1" noChangeArrowheads="1"/>
+          </p:cNvPicPr>
+          <p:nvPr/>
+        </p:nvPicPr>
+        <p:blipFill>
+          <a:blip r:embed="rId2">
+            <a:extLst>
+              <a:ext uri="{28A0092B-C50C-407E-A947-70E740481C1C}">
+                <a14:useLocalDpi xmlns:a14="http://schemas.microsoft.com/office/drawing/2010/main" val="0"/>
+              </a:ext>
+            </a:extLst>
+          </a:blip>
+          <a:srcRect/>
+          <a:stretch>
+            <a:fillRect/>
+          </a:stretch>
+        </p:blipFill>
+        <p:spPr bwMode="auto">
+          <a:xfrm>
+            <a:off x="361249" y="1322331"/>
+            <a:ext cx="4531261" cy="4560283"/>
+          </a:xfrm>
+          <a:prstGeom prst="rect">
+            <a:avLst/>
+          </a:prstGeom>
+          <a:noFill/>
+          <a:ln w="28575">
+            <a:solidFill>
+              <a:schemeClr val="accent1"/>
+            </a:solidFill>
+          </a:ln>
+          <a:extLst>
+            <a:ext uri="{909E8E84-426E-40DD-AFC4-6F175D3DCCD1}">
+              <a14:hiddenFill xmlns:a14="http://schemas.microsoft.com/office/drawing/2010/main">
+                <a:solidFill>
+                  <a:srgbClr val="FFFFFF"/>
+                </a:solidFill>
+              </a14:hiddenFill>
+            </a:ext>
+          </a:extLst>
+        </p:spPr>
+      </p:pic>
+      <p:sp>
+        <p:nvSpPr>
+          <p:cNvPr id="10" name="Text Placeholder 5">
+            <a:extLst>
+              <a:ext uri="{FF2B5EF4-FFF2-40B4-BE49-F238E27FC236}">
+                <a16:creationId xmlns:a16="http://schemas.microsoft.com/office/drawing/2014/main" id="{E5027DF6-2FDD-4035-9CF4-EFFE4D05E040}"/>
+              </a:ext>
+            </a:extLst>
+          </p:cNvPr>
+          <p:cNvSpPr>
+            <a:spLocks noGrp="1"/>
+          </p:cNvSpPr>
+          <p:nvPr>
+            <p:ph type="body" idx="1"/>
           </p:nvPr>
         </p:nvSpPr>
         <p:spPr>
           <a:xfrm>
-            <a:off x="685800" y="1121792"/>
-            <a:ext cx="7772400" cy="5736208"/>
+            <a:off x="343635" y="712356"/>
+            <a:ext cx="4040188" cy="639762"/>
+          </a:xfrm>
+        </p:spPr>
+        <p:txBody>
+          <a:bodyPr/>
+          <a:lstStyle/>
+          <a:p>
+            <a:r>
+              <a:rPr lang="en-US" dirty="0"/>
+              <a:t>What are your clusters?</a:t>
+            </a:r>
+          </a:p>
+        </p:txBody>
+      </p:sp>
+      <p:sp>
+        <p:nvSpPr>
+          <p:cNvPr id="11" name="Text Placeholder 7">
+            <a:extLst>
+              <a:ext uri="{FF2B5EF4-FFF2-40B4-BE49-F238E27FC236}">
+                <a16:creationId xmlns:a16="http://schemas.microsoft.com/office/drawing/2014/main" id="{54061676-15DF-44D5-AD52-347A88245147}"/>
+              </a:ext>
+            </a:extLst>
+          </p:cNvPr>
+          <p:cNvSpPr>
+            <a:spLocks noGrp="1"/>
+          </p:cNvSpPr>
+          <p:nvPr>
+            <p:ph type="body" sz="quarter" idx="3"/>
+          </p:nvPr>
+        </p:nvSpPr>
+        <p:spPr>
+          <a:xfrm>
+            <a:off x="4949791" y="708216"/>
+            <a:ext cx="4041775" cy="639762"/>
+          </a:xfrm>
+        </p:spPr>
+        <p:txBody>
+          <a:bodyPr/>
+          <a:lstStyle/>
+          <a:p>
+            <a:r>
+              <a:rPr lang="en-US" dirty="0"/>
+              <a:t>What do your clusters mean?</a:t>
+            </a:r>
+          </a:p>
+        </p:txBody>
+      </p:sp>
+      <p:pic>
+        <p:nvPicPr>
+          <p:cNvPr id="12" name="Picture 11">
+            <a:extLst>
+              <a:ext uri="{FF2B5EF4-FFF2-40B4-BE49-F238E27FC236}">
+                <a16:creationId xmlns:a16="http://schemas.microsoft.com/office/drawing/2014/main" id="{1FC7D4CE-311D-447D-BF14-59870650E344}"/>
+              </a:ext>
+            </a:extLst>
+          </p:cNvPr>
+          <p:cNvPicPr>
+            <a:picLocks noChangeAspect="1"/>
+          </p:cNvPicPr>
+          <p:nvPr/>
+        </p:nvPicPr>
+        <p:blipFill>
+          <a:blip r:embed="rId3"/>
+          <a:stretch>
+            <a:fillRect/>
+          </a:stretch>
+        </p:blipFill>
+        <p:spPr>
+          <a:xfrm>
+            <a:off x="4987497" y="1322331"/>
+            <a:ext cx="3879017" cy="4560283"/>
+          </a:xfrm>
+          <a:prstGeom prst="rect">
+            <a:avLst/>
+          </a:prstGeom>
+          <a:ln w="28575">
+            <a:solidFill>
+              <a:schemeClr val="accent1"/>
+            </a:solidFill>
+          </a:ln>
+        </p:spPr>
+      </p:pic>
+    </p:spTree>
+    <p:extLst>
+      <p:ext uri="{BB962C8B-B14F-4D97-AF65-F5344CB8AC3E}">
+        <p14:creationId xmlns:p14="http://schemas.microsoft.com/office/powerpoint/2010/main" val="3152235314"/>
+      </p:ext>
+    </p:extLst>
+  </p:cSld>
+  <p:clrMapOvr>
+    <a:masterClrMapping/>
+  </p:clrMapOvr>
+</p:sld>
+</file>
+
+<file path=ppt/slides/slide6.xml><?xml version="1.0" encoding="utf-8"?>
+<p:sld xmlns:a="http://schemas.openxmlformats.org/drawingml/2006/main" xmlns:r="http://schemas.openxmlformats.org/officeDocument/2006/relationships" xmlns:p="http://schemas.openxmlformats.org/presentationml/2006/main">
+  <p:cSld>
+    <p:bg>
+      <p:bgPr>
+        <a:solidFill>
+          <a:schemeClr val="tx1">
+            <a:lumMod val="65000"/>
+            <a:lumOff val="35000"/>
+            <a:alpha val="11000"/>
+          </a:schemeClr>
+        </a:solidFill>
+        <a:effectLst/>
+      </p:bgPr>
+    </p:bg>
+    <p:spTree>
+      <p:nvGrpSpPr>
+        <p:cNvPr id="1" name=""/>
+        <p:cNvGrpSpPr/>
+        <p:nvPr/>
+      </p:nvGrpSpPr>
+      <p:grpSpPr>
+        <a:xfrm>
+          <a:off x="0" y="0"/>
+          <a:ext cx="0" cy="0"/>
+          <a:chOff x="0" y="0"/>
+          <a:chExt cx="0" cy="0"/>
+        </a:xfrm>
+      </p:grpSpPr>
+      <p:sp>
+        <p:nvSpPr>
+          <p:cNvPr id="2" name="Title 1"/>
+          <p:cNvSpPr>
+            <a:spLocks noGrp="1"/>
+          </p:cNvSpPr>
+          <p:nvPr>
+            <p:ph type="title"/>
+          </p:nvPr>
+        </p:nvSpPr>
+        <p:spPr>
+          <a:xfrm>
+            <a:off x="959179" y="65989"/>
+            <a:ext cx="7270423" cy="1055802"/>
           </a:xfrm>
         </p:spPr>
         <p:txBody>
@@ -5145,6 +5457,35 @@
           <a:lstStyle/>
           <a:p>
             <a:r>
+              <a:rPr lang="en-US" sz="3600" dirty="0"/>
+              <a:t>Recommendation of Clustering Solution</a:t>
+            </a:r>
+          </a:p>
+        </p:txBody>
+      </p:sp>
+      <p:sp>
+        <p:nvSpPr>
+          <p:cNvPr id="3" name="Content Placeholder 2"/>
+          <p:cNvSpPr>
+            <a:spLocks noGrp="1"/>
+          </p:cNvSpPr>
+          <p:nvPr>
+            <p:ph idx="1"/>
+          </p:nvPr>
+        </p:nvSpPr>
+        <p:spPr>
+          <a:xfrm>
+            <a:off x="685800" y="1121792"/>
+            <a:ext cx="7772400" cy="5736208"/>
+          </a:xfrm>
+        </p:spPr>
+        <p:txBody>
+          <a:bodyPr>
+            <a:normAutofit/>
+          </a:bodyPr>
+          <a:lstStyle/>
+          <a:p>
+            <a:r>
               <a:rPr lang="en-US" dirty="0"/>
               <a:t>We recommend clustering on psychographic dimensions.</a:t>
             </a:r>
@@ -5245,7 +5586,7 @@
             <a:fld id="{EA1E5914-59AA-0F4C-8D89-5ECCA83988DE}" type="slidenum">
               <a:rPr lang="en-US" smtClean="0"/>
               <a:pPr/>
-              <a:t>5</a:t>
+              <a:t>6</a:t>
             </a:fld>
             <a:endParaRPr lang="en-US" dirty="0"/>
           </a:p>

</xml_diff>